<commit_message>
Update Mobile Wizard Dress-Up Game.pptx
</commit_message>
<xml_diff>
--- a/SchoolReport/Mobile Wizard Dress-Up Game.pptx
+++ b/SchoolReport/Mobile Wizard Dress-Up Game.pptx
@@ -636,7 +636,7 @@
           <a:p>
             <a:fld id="{EA0C0817-A112-4847-8014-A94B7D2A4EA3}" type="datetime1">
               <a:rPr lang="en-US" smtClean="0"/>
-              <a:t>10/23/2019</a:t>
+              <a:t>10/24/2019</a:t>
             </a:fld>
             <a:endParaRPr lang="en-US" dirty="0"/>
           </a:p>
@@ -838,7 +838,7 @@
           <a:p>
             <a:fld id="{134F40B7-36AB-4376-BE14-EF7004D79BB9}" type="datetime1">
               <a:rPr lang="en-US" smtClean="0"/>
-              <a:t>10/23/2019</a:t>
+              <a:t>10/24/2019</a:t>
             </a:fld>
             <a:endParaRPr lang="en-US"/>
           </a:p>
@@ -1018,7 +1018,7 @@
           <a:p>
             <a:fld id="{FF87CAB8-DCAE-46A5-AADA-B3FAD11A54E0}" type="datetime1">
               <a:rPr lang="en-US" smtClean="0"/>
-              <a:t>10/23/2019</a:t>
+              <a:t>10/24/2019</a:t>
             </a:fld>
             <a:endParaRPr lang="en-US"/>
           </a:p>
@@ -1188,7 +1188,7 @@
           <a:p>
             <a:fld id="{7332B432-ACDA-4023-A761-2BAB76577B62}" type="datetime1">
               <a:rPr lang="en-US" smtClean="0"/>
-              <a:t>10/23/2019</a:t>
+              <a:t>10/24/2019</a:t>
             </a:fld>
             <a:endParaRPr lang="en-US"/>
           </a:p>
@@ -1787,7 +1787,7 @@
           <a:p>
             <a:fld id="{D9C646AA-F36E-4540-911D-FFFC0A0EF24A}" type="datetime1">
               <a:rPr lang="en-US" smtClean="0"/>
-              <a:t>10/23/2019</a:t>
+              <a:t>10/24/2019</a:t>
             </a:fld>
             <a:endParaRPr lang="en-US" dirty="0"/>
           </a:p>
@@ -2107,7 +2107,7 @@
           <a:p>
             <a:fld id="{69186D26-FA5F-4637-B602-B7C2DC34CFD4}" type="datetime1">
               <a:rPr lang="en-US" smtClean="0"/>
-              <a:t>10/23/2019</a:t>
+              <a:t>10/24/2019</a:t>
             </a:fld>
             <a:endParaRPr lang="en-US"/>
           </a:p>
@@ -2542,7 +2542,7 @@
           <a:p>
             <a:fld id="{8A7F15D8-96D1-4781-BC50-CA8A088B2FE4}" type="datetime1">
               <a:rPr lang="en-US" smtClean="0"/>
-              <a:t>10/23/2019</a:t>
+              <a:t>10/24/2019</a:t>
             </a:fld>
             <a:endParaRPr lang="en-US"/>
           </a:p>
@@ -2660,7 +2660,7 @@
           <a:p>
             <a:fld id="{F9A96C99-B8F8-4528-BD05-0E16E943DC09}" type="datetime1">
               <a:rPr lang="en-US" smtClean="0"/>
-              <a:t>10/23/2019</a:t>
+              <a:t>10/24/2019</a:t>
             </a:fld>
             <a:endParaRPr lang="en-US"/>
           </a:p>
@@ -2755,7 +2755,7 @@
           <a:p>
             <a:fld id="{03636942-C211-4B28-8DBD-C953E00AF71B}" type="datetime1">
               <a:rPr lang="en-US" smtClean="0"/>
-              <a:t>10/23/2019</a:t>
+              <a:t>10/24/2019</a:t>
             </a:fld>
             <a:endParaRPr lang="en-US"/>
           </a:p>
@@ -3172,7 +3172,7 @@
           <a:p>
             <a:fld id="{7E8D12A6-918A-48BD-8CB9-CA713993B0EA}" type="datetime1">
               <a:rPr lang="en-US" smtClean="0"/>
-              <a:t>10/23/2019</a:t>
+              <a:t>10/24/2019</a:t>
             </a:fld>
             <a:endParaRPr lang="en-US"/>
           </a:p>
@@ -3434,7 +3434,7 @@
             <a:fld id="{E778CE86-875F-4587-BCF6-FA054AFC0D53}" type="datetime1">
               <a:rPr lang="en-US" smtClean="0"/>
               <a:pPr/>
-              <a:t>10/23/2019</a:t>
+              <a:t>10/24/2019</a:t>
             </a:fld>
             <a:endParaRPr lang="en-US" dirty="0"/>
           </a:p>
@@ -3950,7 +3950,7 @@
           <a:p>
             <a:fld id="{F6FA2B21-3FCD-4721-B95C-427943F61125}" type="datetime1">
               <a:rPr lang="en-US" smtClean="0"/>
-              <a:t>10/23/2019</a:t>
+              <a:t>10/24/2019</a:t>
             </a:fld>
             <a:endParaRPr lang="en-US"/>
           </a:p>
@@ -5516,6 +5516,17 @@
             </a:r>
           </a:p>
           <a:p>
+            <a:pPr lvl="2"/>
+            <a:r>
+              <a:rPr lang="en-US" dirty="0"/>
+              <a:t>Allows user to select choices that branch the story</a:t>
+            </a:r>
+          </a:p>
+          <a:p>
+            <a:pPr lvl="2"/>
+            <a:endParaRPr lang="en-US" dirty="0"/>
+          </a:p>
+          <a:p>
             <a:pPr lvl="1"/>
             <a:endParaRPr lang="en-US" dirty="0"/>
           </a:p>
@@ -6019,7 +6030,34 @@
           </a:bodyPr>
           <a:lstStyle/>
           <a:p>
-            <a:endParaRPr lang="en-US"/>
+            <a:r>
+              <a:rPr lang="en-US" dirty="0"/>
+              <a:t>First draft attempt done in Visual studio in C#.</a:t>
+            </a:r>
+          </a:p>
+          <a:p>
+            <a:r>
+              <a:rPr lang="en-US" dirty="0"/>
+              <a:t>The text is piped in from a text file, and there is currently an autogenerated number that allows for timing images correctly based on text location in array</a:t>
+            </a:r>
+          </a:p>
+          <a:p>
+            <a:r>
+              <a:rPr lang="en-US" dirty="0"/>
+              <a:t>Background image is set to stay until changed, foreground is set to vanish unless specified</a:t>
+            </a:r>
+          </a:p>
+          <a:p>
+            <a:r>
+              <a:rPr lang="en-US" dirty="0"/>
+              <a:t>Next button, and previous button in place</a:t>
+            </a:r>
+          </a:p>
+          <a:p>
+            <a:r>
+              <a:rPr lang="en-US" dirty="0"/>
+              <a:t>Currently has branching story abilities</a:t>
+            </a:r>
           </a:p>
         </p:txBody>
       </p:sp>
@@ -6820,24 +6858,30 @@
           <a:lstStyle/>
           <a:p>
             <a:pPr lvl="1"/>
-            <a:endParaRPr lang="en-US" dirty="0"/>
+            <a:r>
+              <a:rPr lang="en-US" dirty="0"/>
+              <a:t>Images are a major part of the immersive exercise and therefore take up the lion’s share of the screen</a:t>
+            </a:r>
           </a:p>
           <a:p>
             <a:pPr lvl="1"/>
             <a:r>
               <a:rPr lang="en-US" dirty="0"/>
-              <a:t>Because it’s a Visual Novel</a:t>
+              <a:t>Text is also imperative to tell the story, but does not need as much room as the image, it therefore takes the second most amount of space</a:t>
             </a:r>
           </a:p>
           <a:p>
             <a:pPr lvl="1"/>
-            <a:endParaRPr lang="en-US" dirty="0"/>
+            <a:r>
+              <a:rPr lang="en-US" dirty="0"/>
+              <a:t>User may want to review previous story point, particularly if a decision needs to be made, ergo both forward and backwards buttons are present</a:t>
+            </a:r>
           </a:p>
           <a:p>
             <a:pPr lvl="1"/>
             <a:r>
               <a:rPr lang="en-US" dirty="0"/>
-              <a:t>Because it’s a Dress Up Game</a:t>
+              <a:t>When selecting a branch the user should see the text that’s prompting the choice, ergo the image gets covered</a:t>
             </a:r>
           </a:p>
         </p:txBody>

</xml_diff>

<commit_message>
Finishing up the report
</commit_message>
<xml_diff>
--- a/SchoolReport/Mobile Wizard Dress-Up Game.pptx
+++ b/SchoolReport/Mobile Wizard Dress-Up Game.pptx
@@ -165,6 +165,271 @@
     </p:ext>
   </p:extLst>
 </p:presentation>
+</file>
+
+<file path=ppt/revisionInfo.xml><?xml version="1.0" encoding="utf-8"?>
+<p1510:revInfo xmlns:a="http://schemas.openxmlformats.org/drawingml/2006/main" xmlns:r="http://schemas.openxmlformats.org/officeDocument/2006/relationships" xmlns:p1510="http://schemas.microsoft.com/office/powerpoint/2015/10/main">
+  <p1510:revLst>
+    <p1510:client id="{63D32000-ECDD-492C-B26E-C9B13285B088}" v="4" dt="2019-10-26T02:28:15.011"/>
+  </p1510:revLst>
+</p1510:revInfo>
+</file>
+
+<file path=ppt/changesInfos/changesInfo1.xml><?xml version="1.0" encoding="utf-8"?>
+<pc:chgInfo xmlns:a="http://schemas.openxmlformats.org/drawingml/2006/main" xmlns:r="http://schemas.openxmlformats.org/officeDocument/2006/relationships" xmlns:ac="http://schemas.microsoft.com/office/drawing/2013/main/command" xmlns:pc="http://schemas.microsoft.com/office/powerpoint/2013/main/command">
+  <pc:docChgLst>
+    <pc:chgData name="Allie Burress" userId="2f55098d3171d9f8" providerId="LiveId" clId="{63D32000-ECDD-492C-B26E-C9B13285B088}"/>
+    <pc:docChg chg="undo custSel modSld">
+      <pc:chgData name="Allie Burress" userId="2f55098d3171d9f8" providerId="LiveId" clId="{63D32000-ECDD-492C-B26E-C9B13285B088}" dt="2019-10-26T03:04:06.401" v="1236" actId="20577"/>
+      <pc:docMkLst>
+        <pc:docMk/>
+      </pc:docMkLst>
+      <pc:sldChg chg="modSp">
+        <pc:chgData name="Allie Burress" userId="2f55098d3171d9f8" providerId="LiveId" clId="{63D32000-ECDD-492C-B26E-C9B13285B088}" dt="2019-10-26T02:08:32.921" v="7" actId="403"/>
+        <pc:sldMkLst>
+          <pc:docMk/>
+          <pc:sldMk cId="2108165467" sldId="257"/>
+        </pc:sldMkLst>
+        <pc:spChg chg="mod">
+          <ac:chgData name="Allie Burress" userId="2f55098d3171d9f8" providerId="LiveId" clId="{63D32000-ECDD-492C-B26E-C9B13285B088}" dt="2019-10-26T02:08:32.921" v="7" actId="403"/>
+          <ac:spMkLst>
+            <pc:docMk/>
+            <pc:sldMk cId="2108165467" sldId="257"/>
+            <ac:spMk id="3" creationId="{C5A1CC11-F2B6-4F3C-B9E6-09E27AFE8738}"/>
+          </ac:spMkLst>
+        </pc:spChg>
+      </pc:sldChg>
+      <pc:sldChg chg="modSp">
+        <pc:chgData name="Allie Burress" userId="2f55098d3171d9f8" providerId="LiveId" clId="{63D32000-ECDD-492C-B26E-C9B13285B088}" dt="2019-10-26T02:09:20.469" v="30" actId="27636"/>
+        <pc:sldMkLst>
+          <pc:docMk/>
+          <pc:sldMk cId="409912786" sldId="258"/>
+        </pc:sldMkLst>
+        <pc:spChg chg="mod">
+          <ac:chgData name="Allie Burress" userId="2f55098d3171d9f8" providerId="LiveId" clId="{63D32000-ECDD-492C-B26E-C9B13285B088}" dt="2019-10-26T02:09:20.469" v="30" actId="27636"/>
+          <ac:spMkLst>
+            <pc:docMk/>
+            <pc:sldMk cId="409912786" sldId="258"/>
+            <ac:spMk id="9" creationId="{F8105A1C-3107-4F81-9481-DDA235852348}"/>
+          </ac:spMkLst>
+        </pc:spChg>
+      </pc:sldChg>
+      <pc:sldChg chg="modSp">
+        <pc:chgData name="Allie Burress" userId="2f55098d3171d9f8" providerId="LiveId" clId="{63D32000-ECDD-492C-B26E-C9B13285B088}" dt="2019-10-26T02:09:44.871" v="36" actId="1076"/>
+        <pc:sldMkLst>
+          <pc:docMk/>
+          <pc:sldMk cId="4152880690" sldId="260"/>
+        </pc:sldMkLst>
+        <pc:spChg chg="mod">
+          <ac:chgData name="Allie Burress" userId="2f55098d3171d9f8" providerId="LiveId" clId="{63D32000-ECDD-492C-B26E-C9B13285B088}" dt="2019-10-26T02:09:37.609" v="34" actId="27636"/>
+          <ac:spMkLst>
+            <pc:docMk/>
+            <pc:sldMk cId="4152880690" sldId="260"/>
+            <ac:spMk id="3" creationId="{701F2B63-E0AE-4BF8-94C0-501D4C963245}"/>
+          </ac:spMkLst>
+        </pc:spChg>
+        <pc:picChg chg="mod">
+          <ac:chgData name="Allie Burress" userId="2f55098d3171d9f8" providerId="LiveId" clId="{63D32000-ECDD-492C-B26E-C9B13285B088}" dt="2019-10-26T02:09:44.871" v="36" actId="1076"/>
+          <ac:picMkLst>
+            <pc:docMk/>
+            <pc:sldMk cId="4152880690" sldId="260"/>
+            <ac:picMk id="5" creationId="{79709396-40CB-4F97-8B6A-A31676C2FDDE}"/>
+          </ac:picMkLst>
+        </pc:picChg>
+      </pc:sldChg>
+      <pc:sldChg chg="modSp">
+        <pc:chgData name="Allie Burress" userId="2f55098d3171d9f8" providerId="LiveId" clId="{63D32000-ECDD-492C-B26E-C9B13285B088}" dt="2019-10-26T03:04:06.401" v="1236" actId="20577"/>
+        <pc:sldMkLst>
+          <pc:docMk/>
+          <pc:sldMk cId="2453177725" sldId="261"/>
+        </pc:sldMkLst>
+        <pc:spChg chg="mod">
+          <ac:chgData name="Allie Burress" userId="2f55098d3171d9f8" providerId="LiveId" clId="{63D32000-ECDD-492C-B26E-C9B13285B088}" dt="2019-10-26T03:04:06.401" v="1236" actId="20577"/>
+          <ac:spMkLst>
+            <pc:docMk/>
+            <pc:sldMk cId="2453177725" sldId="261"/>
+            <ac:spMk id="3" creationId="{05FF4F6D-AB97-4E62-A064-77C84531370B}"/>
+          </ac:spMkLst>
+        </pc:spChg>
+      </pc:sldChg>
+      <pc:sldChg chg="modSp">
+        <pc:chgData name="Allie Burress" userId="2f55098d3171d9f8" providerId="LiveId" clId="{63D32000-ECDD-492C-B26E-C9B13285B088}" dt="2019-10-26T02:31:46.301" v="1220" actId="1076"/>
+        <pc:sldMkLst>
+          <pc:docMk/>
+          <pc:sldMk cId="1461893502" sldId="262"/>
+        </pc:sldMkLst>
+        <pc:spChg chg="mod">
+          <ac:chgData name="Allie Burress" userId="2f55098d3171d9f8" providerId="LiveId" clId="{63D32000-ECDD-492C-B26E-C9B13285B088}" dt="2019-10-26T02:31:46.301" v="1220" actId="1076"/>
+          <ac:spMkLst>
+            <pc:docMk/>
+            <pc:sldMk cId="1461893502" sldId="262"/>
+            <ac:spMk id="3" creationId="{16E7C33F-8388-45F5-A1DB-DC606F59FC6B}"/>
+          </ac:spMkLst>
+        </pc:spChg>
+      </pc:sldChg>
+      <pc:sldChg chg="modSp">
+        <pc:chgData name="Allie Burress" userId="2f55098d3171d9f8" providerId="LiveId" clId="{63D32000-ECDD-492C-B26E-C9B13285B088}" dt="2019-10-26T02:10:28.458" v="48" actId="403"/>
+        <pc:sldMkLst>
+          <pc:docMk/>
+          <pc:sldMk cId="2987874976" sldId="263"/>
+        </pc:sldMkLst>
+        <pc:spChg chg="mod">
+          <ac:chgData name="Allie Burress" userId="2f55098d3171d9f8" providerId="LiveId" clId="{63D32000-ECDD-492C-B26E-C9B13285B088}" dt="2019-10-26T02:10:28.458" v="48" actId="403"/>
+          <ac:spMkLst>
+            <pc:docMk/>
+            <pc:sldMk cId="2987874976" sldId="263"/>
+            <ac:spMk id="3" creationId="{C7B641A5-64C9-42AE-8C77-9DF2AF934D75}"/>
+          </ac:spMkLst>
+        </pc:spChg>
+      </pc:sldChg>
+      <pc:sldChg chg="modSp">
+        <pc:chgData name="Allie Burress" userId="2f55098d3171d9f8" providerId="LiveId" clId="{63D32000-ECDD-492C-B26E-C9B13285B088}" dt="2019-10-26T02:31:58.023" v="1225" actId="27636"/>
+        <pc:sldMkLst>
+          <pc:docMk/>
+          <pc:sldMk cId="2002018725" sldId="264"/>
+        </pc:sldMkLst>
+        <pc:spChg chg="mod">
+          <ac:chgData name="Allie Burress" userId="2f55098d3171d9f8" providerId="LiveId" clId="{63D32000-ECDD-492C-B26E-C9B13285B088}" dt="2019-10-26T02:31:58.023" v="1225" actId="27636"/>
+          <ac:spMkLst>
+            <pc:docMk/>
+            <pc:sldMk cId="2002018725" sldId="264"/>
+            <ac:spMk id="3" creationId="{B5DB21BF-CE04-4144-8F11-D6CC658FCD12}"/>
+          </ac:spMkLst>
+        </pc:spChg>
+      </pc:sldChg>
+      <pc:sldChg chg="modSp">
+        <pc:chgData name="Allie Burress" userId="2f55098d3171d9f8" providerId="LiveId" clId="{63D32000-ECDD-492C-B26E-C9B13285B088}" dt="2019-10-26T02:26:08.586" v="800" actId="20577"/>
+        <pc:sldMkLst>
+          <pc:docMk/>
+          <pc:sldMk cId="1973647165" sldId="265"/>
+        </pc:sldMkLst>
+        <pc:spChg chg="mod">
+          <ac:chgData name="Allie Burress" userId="2f55098d3171d9f8" providerId="LiveId" clId="{63D32000-ECDD-492C-B26E-C9B13285B088}" dt="2019-10-26T02:26:08.586" v="800" actId="20577"/>
+          <ac:spMkLst>
+            <pc:docMk/>
+            <pc:sldMk cId="1973647165" sldId="265"/>
+            <ac:spMk id="3" creationId="{911B3AED-AB0B-4262-9AF0-B8B139E3D7C5}"/>
+          </ac:spMkLst>
+        </pc:spChg>
+      </pc:sldChg>
+      <pc:sldChg chg="modSp">
+        <pc:chgData name="Allie Burress" userId="2f55098d3171d9f8" providerId="LiveId" clId="{63D32000-ECDD-492C-B26E-C9B13285B088}" dt="2019-10-26T02:54:21.892" v="1228" actId="20577"/>
+        <pc:sldMkLst>
+          <pc:docMk/>
+          <pc:sldMk cId="1364638662" sldId="266"/>
+        </pc:sldMkLst>
+        <pc:spChg chg="mod">
+          <ac:chgData name="Allie Burress" userId="2f55098d3171d9f8" providerId="LiveId" clId="{63D32000-ECDD-492C-B26E-C9B13285B088}" dt="2019-10-26T02:54:21.892" v="1228" actId="20577"/>
+          <ac:spMkLst>
+            <pc:docMk/>
+            <pc:sldMk cId="1364638662" sldId="266"/>
+            <ac:spMk id="3" creationId="{C5C7FFC6-ABFC-4308-860B-A43640A2E8A8}"/>
+          </ac:spMkLst>
+        </pc:spChg>
+      </pc:sldChg>
+      <pc:sldChg chg="addSp modSp">
+        <pc:chgData name="Allie Burress" userId="2f55098d3171d9f8" providerId="LiveId" clId="{63D32000-ECDD-492C-B26E-C9B13285B088}" dt="2019-10-26T02:29:59.093" v="988" actId="1076"/>
+        <pc:sldMkLst>
+          <pc:docMk/>
+          <pc:sldMk cId="3114144912" sldId="267"/>
+        </pc:sldMkLst>
+        <pc:spChg chg="mod">
+          <ac:chgData name="Allie Burress" userId="2f55098d3171d9f8" providerId="LiveId" clId="{63D32000-ECDD-492C-B26E-C9B13285B088}" dt="2019-10-26T02:26:28.653" v="804" actId="1076"/>
+          <ac:spMkLst>
+            <pc:docMk/>
+            <pc:sldMk cId="3114144912" sldId="267"/>
+            <ac:spMk id="2" creationId="{658EA430-6BF3-4FCF-9496-0B39D0C2F408}"/>
+          </ac:spMkLst>
+        </pc:spChg>
+        <pc:spChg chg="add mod">
+          <ac:chgData name="Allie Burress" userId="2f55098d3171d9f8" providerId="LiveId" clId="{63D32000-ECDD-492C-B26E-C9B13285B088}" dt="2019-10-26T02:28:37.885" v="873" actId="1076"/>
+          <ac:spMkLst>
+            <pc:docMk/>
+            <pc:sldMk cId="3114144912" sldId="267"/>
+            <ac:spMk id="9" creationId="{B53DC905-BCC0-47DD-A362-3BFE7A664E47}"/>
+          </ac:spMkLst>
+        </pc:spChg>
+        <pc:spChg chg="mod">
+          <ac:chgData name="Allie Burress" userId="2f55098d3171d9f8" providerId="LiveId" clId="{63D32000-ECDD-492C-B26E-C9B13285B088}" dt="2019-10-26T02:29:59.093" v="988" actId="1076"/>
+          <ac:spMkLst>
+            <pc:docMk/>
+            <pc:sldMk cId="3114144912" sldId="267"/>
+            <ac:spMk id="11" creationId="{CEC00062-CAA1-49C3-AE92-7EA1F4EE2B50}"/>
+          </ac:spMkLst>
+        </pc:spChg>
+        <pc:picChg chg="mod">
+          <ac:chgData name="Allie Burress" userId="2f55098d3171d9f8" providerId="LiveId" clId="{63D32000-ECDD-492C-B26E-C9B13285B088}" dt="2019-10-26T02:26:35.973" v="806" actId="14100"/>
+          <ac:picMkLst>
+            <pc:docMk/>
+            <pc:sldMk cId="3114144912" sldId="267"/>
+            <ac:picMk id="5" creationId="{E440038B-4748-4307-BD0E-990492DD817E}"/>
+          </ac:picMkLst>
+        </pc:picChg>
+        <pc:picChg chg="mod ord">
+          <ac:chgData name="Allie Burress" userId="2f55098d3171d9f8" providerId="LiveId" clId="{63D32000-ECDD-492C-B26E-C9B13285B088}" dt="2019-10-26T02:26:47.349" v="810" actId="14100"/>
+          <ac:picMkLst>
+            <pc:docMk/>
+            <pc:sldMk cId="3114144912" sldId="267"/>
+            <ac:picMk id="7" creationId="{BFE6D0E9-172F-4B87-8E41-35F15FBAA1C7}"/>
+          </ac:picMkLst>
+        </pc:picChg>
+        <pc:cxnChg chg="add mod">
+          <ac:chgData name="Allie Burress" userId="2f55098d3171d9f8" providerId="LiveId" clId="{63D32000-ECDD-492C-B26E-C9B13285B088}" dt="2019-10-26T02:28:05.146" v="818" actId="1582"/>
+          <ac:cxnSpMkLst>
+            <pc:docMk/>
+            <pc:sldMk cId="3114144912" sldId="267"/>
+            <ac:cxnSpMk id="4" creationId="{5D595B10-5D75-4AED-A2FD-F09F7DBF66A8}"/>
+          </ac:cxnSpMkLst>
+        </pc:cxnChg>
+      </pc:sldChg>
+      <pc:sldChg chg="modSp">
+        <pc:chgData name="Allie Burress" userId="2f55098d3171d9f8" providerId="LiveId" clId="{63D32000-ECDD-492C-B26E-C9B13285B088}" dt="2019-10-26T02:09:30.232" v="32" actId="27636"/>
+        <pc:sldMkLst>
+          <pc:docMk/>
+          <pc:sldMk cId="2469586204" sldId="268"/>
+        </pc:sldMkLst>
+        <pc:spChg chg="mod">
+          <ac:chgData name="Allie Burress" userId="2f55098d3171d9f8" providerId="LiveId" clId="{63D32000-ECDD-492C-B26E-C9B13285B088}" dt="2019-10-26T02:09:30.232" v="32" actId="27636"/>
+          <ac:spMkLst>
+            <pc:docMk/>
+            <pc:sldMk cId="2469586204" sldId="268"/>
+            <ac:spMk id="9" creationId="{C65AAE04-1564-4D27-A7F2-C32E5EB4EA06}"/>
+          </ac:spMkLst>
+        </pc:spChg>
+      </pc:sldChg>
+      <pc:sldChg chg="modSp">
+        <pc:chgData name="Allie Burress" userId="2f55098d3171d9f8" providerId="LiveId" clId="{63D32000-ECDD-492C-B26E-C9B13285B088}" dt="2019-10-26T02:30:45.539" v="1095" actId="403"/>
+        <pc:sldMkLst>
+          <pc:docMk/>
+          <pc:sldMk cId="3643122354" sldId="269"/>
+        </pc:sldMkLst>
+        <pc:spChg chg="mod">
+          <ac:chgData name="Allie Burress" userId="2f55098d3171d9f8" providerId="LiveId" clId="{63D32000-ECDD-492C-B26E-C9B13285B088}" dt="2019-10-26T02:30:45.539" v="1095" actId="403"/>
+          <ac:spMkLst>
+            <pc:docMk/>
+            <pc:sldMk cId="3643122354" sldId="269"/>
+            <ac:spMk id="3" creationId="{A5195C66-0B3C-49A1-918E-23B46FA16ABC}"/>
+          </ac:spMkLst>
+        </pc:spChg>
+      </pc:sldChg>
+      <pc:sldChg chg="modSp">
+        <pc:chgData name="Allie Burress" userId="2f55098d3171d9f8" providerId="LiveId" clId="{63D32000-ECDD-492C-B26E-C9B13285B088}" dt="2019-10-26T02:10:06.056" v="41" actId="1076"/>
+        <pc:sldMkLst>
+          <pc:docMk/>
+          <pc:sldMk cId="1777125588" sldId="270"/>
+        </pc:sldMkLst>
+        <pc:spChg chg="mod">
+          <ac:chgData name="Allie Burress" userId="2f55098d3171d9f8" providerId="LiveId" clId="{63D32000-ECDD-492C-B26E-C9B13285B088}" dt="2019-10-26T02:10:06.056" v="41" actId="1076"/>
+          <ac:spMkLst>
+            <pc:docMk/>
+            <pc:sldMk cId="1777125588" sldId="270"/>
+            <ac:spMk id="3" creationId="{59C10FF9-40C1-4FDF-A5E8-4C8E607EC540}"/>
+          </ac:spMkLst>
+        </pc:spChg>
+      </pc:sldChg>
+    </pc:docChg>
+  </pc:docChgLst>
+</pc:chgInfo>
 </file>
 
 <file path=ppt/slideLayouts/slideLayout1.xml><?xml version="1.0" encoding="utf-8"?>
@@ -6087,36 +6352,43 @@
             <p:ph idx="1"/>
           </p:nvPr>
         </p:nvSpPr>
-        <p:spPr/>
-        <p:txBody>
-          <a:bodyPr/>
-          <a:lstStyle/>
-          <a:p>
-            <a:r>
-              <a:rPr lang="en-US" dirty="0"/>
+        <p:spPr>
+          <a:xfrm>
+            <a:off x="677334" y="2120833"/>
+            <a:ext cx="8596668" cy="3880773"/>
+          </a:xfrm>
+        </p:spPr>
+        <p:txBody>
+          <a:bodyPr>
+            <a:normAutofit/>
+          </a:bodyPr>
+          <a:lstStyle/>
+          <a:p>
+            <a:r>
+              <a:rPr lang="en-US" sz="3200" dirty="0"/>
               <a:t>Ability to tell story by dressing the character in the story</a:t>
             </a:r>
           </a:p>
           <a:p>
             <a:r>
-              <a:rPr lang="en-US" dirty="0"/>
+              <a:rPr lang="en-US" sz="3200" dirty="0"/>
               <a:t>Ability to involved the user in the game</a:t>
             </a:r>
           </a:p>
           <a:p>
             <a:r>
-              <a:rPr lang="en-US" dirty="0"/>
+              <a:rPr lang="en-US" sz="3200" dirty="0"/>
               <a:t>Enables the user to be creative in dressing up for different scenarios in the story. </a:t>
             </a:r>
           </a:p>
           <a:p>
-            <a:endParaRPr lang="en-US" dirty="0"/>
+            <a:endParaRPr lang="en-US" sz="3200" dirty="0"/>
           </a:p>
           <a:p>
             <a:pPr marL="0" indent="0">
               <a:buNone/>
             </a:pPr>
-            <a:endParaRPr lang="en-US" dirty="0"/>
+            <a:endParaRPr lang="en-US" sz="3200" dirty="0"/>
           </a:p>
         </p:txBody>
       </p:sp>
@@ -6945,12 +7217,12 @@
         </p:spPr>
         <p:txBody>
           <a:bodyPr anchor="ctr">
-            <a:normAutofit/>
+            <a:normAutofit fontScale="92500"/>
           </a:bodyPr>
           <a:lstStyle/>
           <a:p>
             <a:r>
-              <a:rPr lang="en-US">
+              <a:rPr lang="en-US" sz="2400" dirty="0">
                 <a:solidFill>
                   <a:srgbClr val="FFFFFF"/>
                 </a:solidFill>
@@ -6961,7 +7233,7 @@
           <a:p>
             <a:pPr lvl="1"/>
             <a:r>
-              <a:rPr lang="en-US">
+              <a:rPr lang="en-US" sz="2000" dirty="0">
                 <a:solidFill>
                   <a:srgbClr val="FFFFFF"/>
                 </a:solidFill>
@@ -6972,7 +7244,7 @@
           <a:p>
             <a:pPr lvl="1"/>
             <a:r>
-              <a:rPr lang="en-US">
+              <a:rPr lang="en-US" sz="2000" dirty="0">
                 <a:solidFill>
                   <a:srgbClr val="FFFFFF"/>
                 </a:solidFill>
@@ -6982,7 +7254,7 @@
           </a:p>
           <a:p>
             <a:pPr lvl="1"/>
-            <a:endParaRPr lang="en-US">
+            <a:endParaRPr lang="en-US" sz="2000" dirty="0">
               <a:solidFill>
                 <a:srgbClr val="FFFFFF"/>
               </a:solidFill>
@@ -6991,7 +7263,7 @@
           <a:p>
             <a:pPr lvl="1"/>
             <a:r>
-              <a:rPr lang="en-US">
+              <a:rPr lang="en-US" sz="2000" dirty="0">
                 <a:solidFill>
                   <a:srgbClr val="FFFFFF"/>
                 </a:solidFill>
@@ -7002,7 +7274,7 @@
           <a:p>
             <a:pPr lvl="2"/>
             <a:r>
-              <a:rPr lang="en-US">
+              <a:rPr lang="en-US" sz="1800" dirty="0">
                 <a:solidFill>
                   <a:srgbClr val="FFFFFF"/>
                 </a:solidFill>
@@ -7013,30 +7285,29 @@
           <a:p>
             <a:pPr lvl="2"/>
             <a:r>
-              <a:rPr lang="en-US">
+              <a:rPr lang="en-US" sz="1800" dirty="0">
                 <a:solidFill>
                   <a:srgbClr val="FFFFFF"/>
                 </a:solidFill>
               </a:rPr>
-              <a:t>We have decided to switch to Udemy, but as none of us are overly familiar with it that will include a higher learning curve.</a:t>
-            </a:r>
-          </a:p>
-          <a:p>
-            <a:pPr marL="0" indent="0">
-              <a:buNone/>
-            </a:pPr>
-            <a:endParaRPr lang="en-US">
-              <a:solidFill>
-                <a:srgbClr val="FFFFFF"/>
-              </a:solidFill>
-            </a:endParaRPr>
-          </a:p>
-          <a:p>
-            <a:endParaRPr lang="en-US">
-              <a:solidFill>
-                <a:srgbClr val="FFFFFF"/>
-              </a:solidFill>
-            </a:endParaRPr>
+              <a:t>We have decided to switch </a:t>
+            </a:r>
+            <a:r>
+              <a:rPr lang="en-US" sz="1800">
+                <a:solidFill>
+                  <a:srgbClr val="FFFFFF"/>
+                </a:solidFill>
+              </a:rPr>
+              <a:t>to Unity, </a:t>
+            </a:r>
+            <a:r>
+              <a:rPr lang="en-US" sz="1800" dirty="0">
+                <a:solidFill>
+                  <a:srgbClr val="FFFFFF"/>
+                </a:solidFill>
+              </a:rPr>
+              <a:t>but as none of us are overly familiar with it that will include a higher learning curve.</a:t>
+            </a:r>
           </a:p>
         </p:txBody>
       </p:sp>
@@ -7114,40 +7385,63 @@
             <p:ph idx="1"/>
           </p:nvPr>
         </p:nvSpPr>
-        <p:spPr/>
-        <p:txBody>
-          <a:bodyPr/>
-          <a:lstStyle/>
+        <p:spPr>
+          <a:xfrm>
+            <a:off x="677334" y="1488613"/>
+            <a:ext cx="8596668" cy="3880773"/>
+          </a:xfrm>
+        </p:spPr>
+        <p:txBody>
+          <a:bodyPr>
+            <a:normAutofit/>
+          </a:bodyPr>
+          <a:lstStyle/>
+          <a:p>
+            <a:r>
+              <a:rPr lang="en-US" sz="2600" dirty="0"/>
+              <a:t>The game will be mobile</a:t>
+            </a:r>
+          </a:p>
           <a:p>
             <a:pPr lvl="1"/>
             <a:r>
-              <a:rPr lang="en-US" dirty="0"/>
-              <a:t>The game will be mobile</a:t>
-            </a:r>
-          </a:p>
-          <a:p>
-            <a:pPr lvl="2"/>
-            <a:r>
-              <a:rPr lang="en-US" dirty="0"/>
+              <a:rPr lang="en-US" sz="2200" dirty="0"/>
               <a:t>Needs to make best use of real estate</a:t>
             </a:r>
           </a:p>
           <a:p>
-            <a:pPr lvl="2"/>
-            <a:r>
-              <a:rPr lang="en-US" dirty="0"/>
+            <a:pPr lvl="1"/>
+            <a:r>
+              <a:rPr lang="en-US" sz="2200" dirty="0"/>
               <a:t>Needs to respond to touch</a:t>
             </a:r>
           </a:p>
           <a:p>
-            <a:pPr lvl="2"/>
-            <a:r>
-              <a:rPr lang="en-US" dirty="0"/>
+            <a:pPr lvl="1"/>
+            <a:r>
+              <a:rPr lang="en-US" sz="2200" dirty="0"/>
               <a:t>Size of program becomes higher priority them mobile game</a:t>
             </a:r>
           </a:p>
           <a:p>
-            <a:endParaRPr lang="en-US" dirty="0"/>
+            <a:r>
+              <a:rPr lang="en-US" sz="2400" dirty="0"/>
+              <a:t>Implementation on mobile is new to us</a:t>
+            </a:r>
+          </a:p>
+          <a:p>
+            <a:pPr lvl="1"/>
+            <a:r>
+              <a:rPr lang="en-US" sz="2200" dirty="0"/>
+              <a:t>Using Unity</a:t>
+            </a:r>
+          </a:p>
+          <a:p>
+            <a:pPr lvl="1"/>
+            <a:r>
+              <a:rPr lang="en-US" sz="2200" dirty="0"/>
+              <a:t>Big learning curve</a:t>
+            </a:r>
           </a:p>
         </p:txBody>
       </p:sp>
@@ -7227,22 +7521,24 @@
         </p:nvSpPr>
         <p:spPr/>
         <p:txBody>
-          <a:bodyPr/>
-          <a:lstStyle/>
-          <a:p>
-            <a:r>
-              <a:rPr lang="en-US" dirty="0"/>
+          <a:bodyPr>
+            <a:normAutofit/>
+          </a:bodyPr>
+          <a:lstStyle/>
+          <a:p>
+            <a:r>
+              <a:rPr lang="en-US" sz="2800" dirty="0"/>
               <a:t>Need ability to store wardrobe</a:t>
             </a:r>
           </a:p>
           <a:p>
             <a:r>
-              <a:rPr lang="en-US" dirty="0"/>
+              <a:rPr lang="en-US" sz="2800" dirty="0"/>
               <a:t>Need clothing for character to alter image of character</a:t>
             </a:r>
           </a:p>
           <a:p>
-            <a:endParaRPr lang="en-US" dirty="0"/>
+            <a:endParaRPr lang="en-US" sz="2800" dirty="0"/>
           </a:p>
         </p:txBody>
       </p:sp>
@@ -7320,77 +7616,79 @@
             <p:ph idx="1"/>
           </p:nvPr>
         </p:nvSpPr>
-        <p:spPr/>
-        <p:txBody>
-          <a:bodyPr/>
-          <a:lstStyle/>
-          <a:p>
-            <a:r>
-              <a:rPr lang="en-US" dirty="0"/>
+        <p:spPr>
+          <a:xfrm>
+            <a:off x="677334" y="1488613"/>
+            <a:ext cx="8596668" cy="4382100"/>
+          </a:xfrm>
+        </p:spPr>
+        <p:txBody>
+          <a:bodyPr>
+            <a:normAutofit fontScale="92500" lnSpcReduction="20000"/>
+          </a:bodyPr>
+          <a:lstStyle/>
+          <a:p>
+            <a:r>
+              <a:rPr lang="en-US" sz="2800" dirty="0"/>
               <a:t>Responsibility of Each Member	</a:t>
             </a:r>
           </a:p>
           <a:p>
             <a:pPr lvl="1"/>
             <a:r>
-              <a:rPr lang="en-US" dirty="0"/>
+              <a:rPr lang="en-US" sz="2400" dirty="0"/>
               <a:t>Anna -Visual Novel</a:t>
             </a:r>
           </a:p>
           <a:p>
             <a:pPr lvl="1"/>
             <a:r>
-              <a:rPr lang="en-US" dirty="0"/>
+              <a:rPr lang="en-US" sz="2400" dirty="0"/>
               <a:t>Allie - Mobile Game</a:t>
             </a:r>
           </a:p>
           <a:p>
             <a:pPr lvl="1"/>
             <a:r>
-              <a:rPr lang="en-US" dirty="0"/>
+              <a:rPr lang="en-US" sz="2400" dirty="0"/>
               <a:t>Gladys - Dress Up Interface</a:t>
             </a:r>
           </a:p>
           <a:p>
             <a:pPr lvl="1"/>
-            <a:endParaRPr lang="en-US" dirty="0"/>
+            <a:endParaRPr lang="en-US" sz="2400" dirty="0"/>
           </a:p>
           <a:p>
             <a:pPr lvl="1"/>
             <a:r>
-              <a:rPr lang="en-US" dirty="0"/>
+              <a:rPr lang="en-US" sz="2400" dirty="0"/>
               <a:t>TimeLine:</a:t>
             </a:r>
           </a:p>
           <a:p>
             <a:pPr lvl="2"/>
             <a:r>
-              <a:rPr lang="en-US" dirty="0"/>
+              <a:rPr lang="en-US" sz="2000" dirty="0"/>
               <a:t>By End of October: Get early draft of visual novel interface finished</a:t>
             </a:r>
           </a:p>
           <a:p>
             <a:pPr lvl="2"/>
             <a:r>
-              <a:rPr lang="en-US" dirty="0"/>
+              <a:rPr lang="en-US" sz="2000" dirty="0"/>
               <a:t>By Mid November: Get Mobile Game and Dress Up Interface running independently</a:t>
             </a:r>
           </a:p>
           <a:p>
             <a:pPr lvl="2"/>
             <a:r>
-              <a:rPr lang="en-US" dirty="0"/>
-              <a:t>By End of November: Debug and get three sections </a:t>
-            </a:r>
-            <a:r>
-              <a:rPr lang="en-US"/>
-              <a:t>working together</a:t>
-            </a:r>
-            <a:endParaRPr lang="en-US" dirty="0"/>
+              <a:rPr lang="en-US" sz="2000" dirty="0"/>
+              <a:t>By End of November: Debug and get three sections working together</a:t>
+            </a:r>
           </a:p>
           <a:p>
             <a:pPr lvl="2"/>
-            <a:endParaRPr lang="en-US" dirty="0"/>
+            <a:endParaRPr lang="en-US" sz="2000" dirty="0"/>
           </a:p>
         </p:txBody>
       </p:sp>
@@ -7475,42 +7773,30 @@
           </a:xfrm>
         </p:spPr>
         <p:txBody>
-          <a:bodyPr/>
+          <a:bodyPr>
+            <a:normAutofit/>
+          </a:bodyPr>
           <a:lstStyle/>
           <a:p>
             <a:pPr lvl="1"/>
             <a:r>
-              <a:rPr lang="en-US" dirty="0"/>
+              <a:rPr lang="en-US" sz="3200" dirty="0"/>
               <a:t>Visual Novel</a:t>
             </a:r>
           </a:p>
           <a:p>
             <a:pPr lvl="2"/>
             <a:r>
-              <a:rPr lang="en-US" dirty="0"/>
+              <a:rPr lang="en-US" sz="2800" dirty="0"/>
               <a:t>Allows user to progress through a story with images.</a:t>
             </a:r>
           </a:p>
           <a:p>
             <a:pPr lvl="2"/>
             <a:r>
-              <a:rPr lang="en-US" dirty="0"/>
+              <a:rPr lang="en-US" sz="2800" dirty="0"/>
               <a:t>Allows user to select choices that branch the story</a:t>
             </a:r>
-          </a:p>
-          <a:p>
-            <a:pPr marL="914400" lvl="2" indent="0">
-              <a:buNone/>
-            </a:pPr>
-            <a:endParaRPr lang="en-US" dirty="0"/>
-          </a:p>
-          <a:p>
-            <a:pPr lvl="2"/>
-            <a:endParaRPr lang="en-US" dirty="0"/>
-          </a:p>
-          <a:p>
-            <a:pPr lvl="1"/>
-            <a:endParaRPr lang="en-US" dirty="0"/>
           </a:p>
         </p:txBody>
       </p:sp>
@@ -7588,17 +7874,51 @@
             <p:ph idx="1"/>
           </p:nvPr>
         </p:nvSpPr>
-        <p:spPr/>
+        <p:spPr>
+          <a:xfrm>
+            <a:off x="677334" y="1488613"/>
+            <a:ext cx="8596668" cy="3880773"/>
+          </a:xfrm>
+        </p:spPr>
         <p:txBody>
           <a:bodyPr/>
           <a:lstStyle/>
           <a:p>
-            <a:pPr marL="0" indent="0">
-              <a:buNone/>
-            </a:pPr>
             <a:r>
               <a:rPr lang="en-US" dirty="0"/>
-              <a:t>	</a:t>
+              <a:t>Imagine you want to play a new mobile game to pass some free time</a:t>
+            </a:r>
+          </a:p>
+          <a:p>
+            <a:r>
+              <a:rPr lang="en-US" dirty="0"/>
+              <a:t>Luckily, Mobile Wizard and Dress-Up game is installed on your phone!</a:t>
+            </a:r>
+          </a:p>
+          <a:p>
+            <a:r>
+              <a:rPr lang="en-US" dirty="0"/>
+              <a:t>Advantages:</a:t>
+            </a:r>
+          </a:p>
+          <a:p>
+            <a:pPr lvl="1"/>
+            <a:r>
+              <a:rPr lang="en-US" dirty="0"/>
+              <a:t>Mobile– no need to stay home to play this game! This story goes wherever you go!</a:t>
+            </a:r>
+          </a:p>
+          <a:p>
+            <a:pPr lvl="1"/>
+            <a:r>
+              <a:rPr lang="en-US" dirty="0"/>
+              <a:t>Being on a mobile phone allows more functionality- touch input, accelerometer function, even microphone use!</a:t>
+            </a:r>
+          </a:p>
+          <a:p>
+            <a:r>
+              <a:rPr lang="en-US" dirty="0"/>
+              <a:t>Combined with the compelling visual novel and dress-up game functionality, this on-the-go choose-your-own-adventure game will quickly be your new favorite mobile game. </a:t>
             </a:r>
           </a:p>
         </p:txBody>
@@ -7680,71 +8000,43 @@
         <p:spPr/>
         <p:txBody>
           <a:bodyPr>
-            <a:normAutofit/>
+            <a:normAutofit fontScale="92500" lnSpcReduction="10000"/>
           </a:bodyPr>
           <a:lstStyle/>
           <a:p>
-            <a:pPr marL="457200" lvl="1" indent="0">
-              <a:buNone/>
-            </a:pPr>
-            <a:endParaRPr lang="en-US" dirty="0"/>
-          </a:p>
-          <a:p>
             <a:pPr lvl="1"/>
             <a:r>
-              <a:rPr lang="en-US" dirty="0"/>
-              <a:t>Allows the user to select clothing of their choice in ward rope</a:t>
+              <a:rPr lang="en-US" sz="2400" dirty="0"/>
+              <a:t>Allows the user to select clothing of their choice in wardrobe</a:t>
             </a:r>
           </a:p>
           <a:p>
             <a:pPr lvl="1"/>
             <a:r>
-              <a:rPr lang="en-US" dirty="0"/>
+              <a:rPr lang="en-US" sz="2400" dirty="0"/>
               <a:t>Allows the user to get involved in the story by choosing what to wear for the day, what story to follow.</a:t>
             </a:r>
           </a:p>
           <a:p>
             <a:pPr lvl="1"/>
             <a:r>
-              <a:rPr lang="en-US" dirty="0"/>
+              <a:rPr lang="en-US" sz="2400" dirty="0"/>
               <a:t>Allows the user to interact and communicate with the character.</a:t>
             </a:r>
           </a:p>
           <a:p>
             <a:pPr lvl="1"/>
             <a:r>
-              <a:rPr lang="en-US" dirty="0"/>
+              <a:rPr lang="en-US" sz="2400" dirty="0"/>
               <a:t>Allows the user to explore all ways of dressing up, thus developing interest in the game</a:t>
             </a:r>
           </a:p>
           <a:p>
             <a:pPr lvl="1"/>
             <a:r>
-              <a:rPr lang="en-US" dirty="0"/>
-              <a:t>Allows the user be creative in dressing-up especially that involves competition in the story</a:t>
-            </a:r>
-          </a:p>
-          <a:p>
-            <a:pPr lvl="1"/>
-            <a:endParaRPr lang="en-US" dirty="0"/>
-          </a:p>
-          <a:p>
-            <a:pPr marL="457200" lvl="1" indent="0">
-              <a:buNone/>
-            </a:pPr>
-            <a:endParaRPr lang="en-US" dirty="0"/>
-          </a:p>
-          <a:p>
-            <a:endParaRPr lang="en-US" dirty="0"/>
-          </a:p>
-          <a:p>
-            <a:endParaRPr lang="en-US" dirty="0"/>
-          </a:p>
-          <a:p>
-            <a:pPr marL="0" indent="0">
-              <a:buNone/>
-            </a:pPr>
-            <a:endParaRPr lang="en-US" dirty="0"/>
+              <a:rPr lang="en-US" sz="2400" dirty="0"/>
+              <a:t>Allows the user to be creative in dressing-up especially that involves competition in the story</a:t>
+            </a:r>
           </a:p>
         </p:txBody>
       </p:sp>
@@ -8604,7 +8896,7 @@
         </p:spPr>
         <p:txBody>
           <a:bodyPr anchor="t">
-            <a:normAutofit/>
+            <a:normAutofit fontScale="92500" lnSpcReduction="10000"/>
           </a:bodyPr>
           <a:lstStyle/>
           <a:p>
@@ -8614,7 +8906,7 @@
               </a:lnSpc>
             </a:pPr>
             <a:r>
-              <a:rPr lang="en-US" sz="1500">
+              <a:rPr lang="en-US" dirty="0">
                 <a:solidFill>
                   <a:srgbClr val="FFFFFF"/>
                 </a:solidFill>
@@ -8629,7 +8921,7 @@
               </a:lnSpc>
             </a:pPr>
             <a:r>
-              <a:rPr lang="en-US" sz="1500">
+              <a:rPr lang="en-US" dirty="0">
                 <a:solidFill>
                   <a:srgbClr val="FFFFFF"/>
                 </a:solidFill>
@@ -8644,7 +8936,7 @@
               </a:lnSpc>
             </a:pPr>
             <a:r>
-              <a:rPr lang="en-US" sz="1500">
+              <a:rPr lang="en-US" dirty="0">
                 <a:solidFill>
                   <a:srgbClr val="FFFFFF"/>
                 </a:solidFill>
@@ -8659,7 +8951,7 @@
               </a:lnSpc>
             </a:pPr>
             <a:r>
-              <a:rPr lang="en-US" sz="1500">
+              <a:rPr lang="en-US" dirty="0">
                 <a:solidFill>
                   <a:srgbClr val="FFFFFF"/>
                 </a:solidFill>
@@ -8674,7 +8966,7 @@
               </a:lnSpc>
             </a:pPr>
             <a:r>
-              <a:rPr lang="en-US" sz="1500">
+              <a:rPr lang="en-US" dirty="0">
                 <a:solidFill>
                   <a:srgbClr val="FFFFFF"/>
                 </a:solidFill>
@@ -8740,7 +9032,7 @@
         </p:nvSpPr>
         <p:spPr>
           <a:xfrm>
-            <a:off x="4706982" y="642593"/>
+            <a:off x="691574" y="492642"/>
             <a:ext cx="6736084" cy="1744183"/>
           </a:xfrm>
         </p:spPr>
@@ -8751,7 +9043,7 @@
           <a:lstStyle/>
           <a:p>
             <a:r>
-              <a:rPr lang="en-US" sz="3600"/>
+              <a:rPr lang="en-US" sz="3600" dirty="0"/>
               <a:t>Prototypes – Mobile Game</a:t>
             </a:r>
           </a:p>
@@ -8775,8 +9067,8 @@
         </p:nvSpPr>
         <p:spPr>
           <a:xfrm>
-            <a:off x="4834965" y="2386584"/>
-            <a:ext cx="6608101" cy="3648456"/>
+            <a:off x="5890201" y="1727697"/>
+            <a:ext cx="3852738" cy="5130303"/>
           </a:xfrm>
         </p:spPr>
         <p:txBody>
@@ -8785,16 +9077,47 @@
           </a:bodyPr>
           <a:lstStyle/>
           <a:p>
-            <a:endParaRPr lang="en-US"/>
+            <a:r>
+              <a:rPr lang="en-US" sz="2800" dirty="0"/>
+              <a:t>Important features:</a:t>
+            </a:r>
+          </a:p>
+          <a:p>
+            <a:pPr lvl="1"/>
+            <a:r>
+              <a:rPr lang="en-US" sz="2400" dirty="0"/>
+              <a:t>Click-through story </a:t>
+            </a:r>
+          </a:p>
+          <a:p>
+            <a:pPr lvl="1"/>
+            <a:r>
+              <a:rPr lang="en-US" sz="2400" dirty="0"/>
+              <a:t>Hamburger Menu</a:t>
+            </a:r>
+          </a:p>
+          <a:p>
+            <a:pPr lvl="1"/>
+            <a:r>
+              <a:rPr lang="en-US" sz="2400" dirty="0"/>
+              <a:t>Choice Pop-ups </a:t>
+            </a:r>
+          </a:p>
+          <a:p>
+            <a:pPr lvl="1"/>
+            <a:r>
+              <a:rPr lang="en-US" sz="2400" dirty="0"/>
+              <a:t>Exit Button</a:t>
+            </a:r>
           </a:p>
         </p:txBody>
       </p:sp>
       <p:pic>
         <p:nvPicPr>
-          <p:cNvPr id="7" name="Picture 6" descr="A screenshot of a cell phone&#10;&#10;Description automatically generated">
+          <p:cNvPr id="5" name="Content Placeholder 4" descr="A screenshot of a cell phone&#10;&#10;Description automatically generated">
             <a:extLst>
               <a:ext uri="{FF2B5EF4-FFF2-40B4-BE49-F238E27FC236}">
-                <a16:creationId xmlns:a16="http://schemas.microsoft.com/office/drawing/2014/main" id="{BFE6D0E9-172F-4B87-8E41-35F15FBAA1C7}"/>
+                <a16:creationId xmlns:a16="http://schemas.microsoft.com/office/drawing/2014/main" id="{E440038B-4748-4307-BD0E-990492DD817E}"/>
               </a:ext>
             </a:extLst>
           </p:cNvPr>
@@ -8817,8 +9140,8 @@
         </p:blipFill>
         <p:spPr>
           <a:xfrm>
-            <a:off x="1274469" y="484635"/>
-            <a:ext cx="1743764" cy="2790023"/>
+            <a:off x="691574" y="1235055"/>
+            <a:ext cx="3403348" cy="4015750"/>
           </a:xfrm>
           <a:prstGeom prst="rect">
             <a:avLst/>
@@ -8827,10 +9150,10 @@
       </p:pic>
       <p:pic>
         <p:nvPicPr>
-          <p:cNvPr id="5" name="Content Placeholder 4" descr="A screenshot of a cell phone&#10;&#10;Description automatically generated">
+          <p:cNvPr id="7" name="Picture 6" descr="A screenshot of a cell phone&#10;&#10;Description automatically generated">
             <a:extLst>
               <a:ext uri="{FF2B5EF4-FFF2-40B4-BE49-F238E27FC236}">
-                <a16:creationId xmlns:a16="http://schemas.microsoft.com/office/drawing/2014/main" id="{E440038B-4748-4307-BD0E-990492DD817E}"/>
+                <a16:creationId xmlns:a16="http://schemas.microsoft.com/office/drawing/2014/main" id="{BFE6D0E9-172F-4B87-8E41-35F15FBAA1C7}"/>
               </a:ext>
             </a:extLst>
           </p:cNvPr>
@@ -8853,14 +9176,92 @@
         </p:blipFill>
         <p:spPr>
           <a:xfrm>
-            <a:off x="926858" y="3435520"/>
-            <a:ext cx="2364545" cy="2790024"/>
+            <a:off x="3223039" y="2299773"/>
+            <a:ext cx="2621169" cy="4193871"/>
           </a:xfrm>
           <a:prstGeom prst="rect">
             <a:avLst/>
           </a:prstGeom>
         </p:spPr>
       </p:pic>
+      <p:cxnSp>
+        <p:nvCxnSpPr>
+          <p:cNvPr id="4" name="Connector: Elbow 3">
+            <a:extLst>
+              <a:ext uri="{FF2B5EF4-FFF2-40B4-BE49-F238E27FC236}">
+                <a16:creationId xmlns:a16="http://schemas.microsoft.com/office/drawing/2014/main" id="{5D595B10-5D75-4AED-A2FD-F09F7DBF66A8}"/>
+              </a:ext>
+            </a:extLst>
+          </p:cNvPr>
+          <p:cNvCxnSpPr>
+            <a:cxnSpLocks/>
+          </p:cNvCxnSpPr>
+          <p:nvPr/>
+        </p:nvCxnSpPr>
+        <p:spPr>
+          <a:xfrm>
+            <a:off x="1258957" y="5250805"/>
+            <a:ext cx="1964082" cy="1017473"/>
+          </a:xfrm>
+          <a:prstGeom prst="bentConnector3">
+            <a:avLst>
+              <a:gd name="adj1" fmla="val 745"/>
+            </a:avLst>
+          </a:prstGeom>
+          <a:ln w="38100">
+            <a:tailEnd type="triangle"/>
+          </a:ln>
+        </p:spPr>
+        <p:style>
+          <a:lnRef idx="1">
+            <a:schemeClr val="accent1"/>
+          </a:lnRef>
+          <a:fillRef idx="0">
+            <a:schemeClr val="accent1"/>
+          </a:fillRef>
+          <a:effectRef idx="0">
+            <a:schemeClr val="accent1"/>
+          </a:effectRef>
+          <a:fontRef idx="minor">
+            <a:schemeClr val="tx1"/>
+          </a:fontRef>
+        </p:style>
+      </p:cxnSp>
+      <p:sp>
+        <p:nvSpPr>
+          <p:cNvPr id="9" name="TextBox 8">
+            <a:extLst>
+              <a:ext uri="{FF2B5EF4-FFF2-40B4-BE49-F238E27FC236}">
+                <a16:creationId xmlns:a16="http://schemas.microsoft.com/office/drawing/2014/main" id="{B53DC905-BCC0-47DD-A362-3BFE7A664E47}"/>
+              </a:ext>
+            </a:extLst>
+          </p:cNvPr>
+          <p:cNvSpPr txBox="1"/>
+          <p:nvPr/>
+        </p:nvSpPr>
+        <p:spPr>
+          <a:xfrm>
+            <a:off x="1372981" y="5453477"/>
+            <a:ext cx="1736035" cy="830997"/>
+          </a:xfrm>
+          <a:prstGeom prst="rect">
+            <a:avLst/>
+          </a:prstGeom>
+          <a:noFill/>
+        </p:spPr>
+        <p:txBody>
+          <a:bodyPr wrap="square" rtlCol="0">
+            <a:spAutoFit/>
+          </a:bodyPr>
+          <a:lstStyle/>
+          <a:p>
+            <a:r>
+              <a:rPr lang="en-US" sz="1600" dirty="0"/>
+              <a:t>Pop up appears when the user is offered a choice</a:t>
+            </a:r>
+          </a:p>
+        </p:txBody>
+      </p:sp>
     </p:spTree>
     <p:extLst>
       <p:ext uri="{BB962C8B-B14F-4D97-AF65-F5344CB8AC3E}">
@@ -8988,67 +9389,67 @@
         </p:spPr>
         <p:txBody>
           <a:bodyPr>
-            <a:normAutofit/>
+            <a:normAutofit fontScale="92500"/>
           </a:bodyPr>
           <a:lstStyle/>
           <a:p>
             <a:r>
-              <a:rPr lang="en-US" dirty="0"/>
+              <a:rPr lang="en-US" sz="2000" dirty="0"/>
               <a:t>User may want to change clothing style and color based on parts of the story or the current emotions:</a:t>
             </a:r>
           </a:p>
           <a:p>
             <a:pPr lvl="1"/>
             <a:r>
-              <a:rPr lang="en-US" dirty="0"/>
+              <a:rPr lang="en-US" sz="1800" dirty="0"/>
               <a:t>Shirts</a:t>
             </a:r>
           </a:p>
           <a:p>
             <a:pPr lvl="1"/>
             <a:r>
-              <a:rPr lang="en-US" dirty="0"/>
+              <a:rPr lang="en-US" sz="1800" dirty="0"/>
               <a:t>Pants</a:t>
             </a:r>
           </a:p>
           <a:p>
             <a:pPr lvl="1"/>
             <a:r>
-              <a:rPr lang="en-US" dirty="0"/>
+              <a:rPr lang="en-US" sz="1800" dirty="0"/>
               <a:t>Shoes</a:t>
             </a:r>
           </a:p>
           <a:p>
             <a:pPr lvl="1"/>
             <a:r>
-              <a:rPr lang="en-US" dirty="0"/>
+              <a:rPr lang="en-US" sz="1800" dirty="0"/>
               <a:t>Eyeglasses</a:t>
             </a:r>
           </a:p>
           <a:p>
             <a:pPr lvl="1"/>
             <a:r>
-              <a:rPr lang="en-US" dirty="0"/>
+              <a:rPr lang="en-US" sz="1800" dirty="0"/>
               <a:t>scarfs</a:t>
             </a:r>
           </a:p>
           <a:p>
             <a:pPr lvl="1"/>
             <a:r>
-              <a:rPr lang="en-US" dirty="0"/>
+              <a:rPr lang="en-US" sz="1800" dirty="0"/>
               <a:t>Hair</a:t>
             </a:r>
           </a:p>
           <a:p>
             <a:pPr lvl="1"/>
             <a:r>
-              <a:rPr lang="en-US" dirty="0"/>
+              <a:rPr lang="en-US" sz="1800" dirty="0"/>
               <a:t>Dresses </a:t>
             </a:r>
           </a:p>
           <a:p>
             <a:pPr lvl="1"/>
-            <a:endParaRPr lang="en-US" dirty="0"/>
+            <a:endParaRPr lang="en-US" sz="1800" dirty="0"/>
           </a:p>
         </p:txBody>
       </p:sp>
@@ -9119,13 +9520,13 @@
           <a:lstStyle/>
           <a:p>
             <a:r>
-              <a:rPr lang="en-US" sz="3600"/>
+              <a:rPr lang="en-US" sz="3600" dirty="0"/>
               <a:t>Design Rationale - Visual Novel</a:t>
             </a:r>
             <a:br>
-              <a:rPr lang="en-US" sz="3600"/>
+              <a:rPr lang="en-US" sz="3600" dirty="0"/>
             </a:br>
-            <a:endParaRPr lang="en-US" sz="3600"/>
+            <a:endParaRPr lang="en-US" sz="3600" dirty="0"/>
           </a:p>
         </p:txBody>
       </p:sp>
@@ -9153,44 +9554,43 @@
         </p:spPr>
         <p:txBody>
           <a:bodyPr>
-            <a:normAutofit/>
+            <a:normAutofit fontScale="92500" lnSpcReduction="10000"/>
           </a:bodyPr>
           <a:lstStyle/>
           <a:p>
             <a:pPr lvl="1"/>
             <a:r>
-              <a:rPr lang="en-US" sz="1600" dirty="0"/>
+              <a:rPr lang="en-US" sz="1800" dirty="0"/>
               <a:t>Images are a major part of the immersive exercise and therefore take up the lion’s share of the screen</a:t>
             </a:r>
           </a:p>
           <a:p>
             <a:pPr lvl="1"/>
             <a:r>
-              <a:rPr lang="en-US" sz="1600" dirty="0"/>
+              <a:rPr lang="en-US" sz="1800" dirty="0"/>
               <a:t>Text is also imperative to tell the story, but does not need as much room as the image, it therefore takes the second most amount of space</a:t>
             </a:r>
           </a:p>
           <a:p>
             <a:pPr lvl="1"/>
             <a:r>
-              <a:rPr lang="en-US" sz="1600" dirty="0"/>
+              <a:rPr lang="en-US" sz="1800" dirty="0"/>
               <a:t>User may want to review previous story point, particularly if a decision needs to be made, ergo both forward and backwards buttons are present</a:t>
             </a:r>
           </a:p>
           <a:p>
             <a:pPr lvl="1"/>
             <a:r>
-              <a:rPr lang="en-US" sz="1600" dirty="0"/>
+              <a:rPr lang="en-US" sz="1800" dirty="0"/>
               <a:t>When selecting a branch the user should see the text that’s prompting the choice, ergo the image gets covered</a:t>
             </a:r>
           </a:p>
           <a:p>
             <a:pPr lvl="1"/>
             <a:r>
-              <a:rPr lang="en-US" dirty="0"/>
+              <a:rPr lang="en-US" sz="1800" dirty="0"/>
               <a:t>User should not be overwhelmed, therefor limit choices to three at most</a:t>
             </a:r>
-            <a:endParaRPr lang="en-US" sz="1600" dirty="0"/>
           </a:p>
         </p:txBody>
       </p:sp>
@@ -9222,8 +9622,8 @@
         </p:blipFill>
         <p:spPr>
           <a:xfrm>
-            <a:off x="8316242" y="1818366"/>
-            <a:ext cx="3322121" cy="3222457"/>
+            <a:off x="7534921" y="1252439"/>
+            <a:ext cx="4487755" cy="4353122"/>
           </a:xfrm>
           <a:prstGeom prst="rect">
             <a:avLst/>
@@ -9310,49 +9710,29 @@
         </p:nvSpPr>
         <p:spPr/>
         <p:txBody>
-          <a:bodyPr/>
-          <a:lstStyle/>
-          <a:p>
-            <a:pPr marL="0" indent="0">
-              <a:buNone/>
-            </a:pPr>
-            <a:endParaRPr lang="en-US" dirty="0"/>
-          </a:p>
+          <a:bodyPr>
+            <a:normAutofit/>
+          </a:bodyPr>
+          <a:lstStyle/>
           <a:p>
             <a:pPr lvl="1"/>
             <a:r>
-              <a:rPr lang="en-US" dirty="0"/>
+              <a:rPr lang="en-US" sz="2800" dirty="0"/>
               <a:t>We need to keep everything on a relatively small screen with comparatively large context</a:t>
             </a:r>
           </a:p>
           <a:p>
             <a:pPr lvl="1"/>
             <a:r>
-              <a:rPr lang="en-US" dirty="0"/>
+              <a:rPr lang="en-US" sz="2800" dirty="0"/>
               <a:t>Multiple Windows would be inefficient</a:t>
             </a:r>
           </a:p>
           <a:p>
             <a:pPr lvl="1"/>
-            <a:endParaRPr lang="en-US" dirty="0"/>
-          </a:p>
-          <a:p>
-            <a:pPr marL="457200" lvl="1" indent="0">
-              <a:buNone/>
-            </a:pPr>
-            <a:endParaRPr lang="en-US" dirty="0"/>
-          </a:p>
-          <a:p>
-            <a:pPr lvl="1"/>
-            <a:endParaRPr lang="en-US" dirty="0"/>
-          </a:p>
-          <a:p>
-            <a:pPr marL="0" indent="0">
-              <a:buNone/>
-            </a:pPr>
-            <a:r>
-              <a:rPr lang="en-US" dirty="0"/>
-              <a:t>	</a:t>
+            <a:r>
+              <a:rPr lang="en-US" sz="2800" dirty="0"/>
+              <a:t>Mobile implementation gives us access to different capabilities, i.e. touch, accelerometer</a:t>
             </a:r>
           </a:p>
         </p:txBody>

</xml_diff>